<commit_message>
add camera and position
</commit_message>
<xml_diff>
--- a/course/Progressive Web Apps.pptx
+++ b/course/Progressive Web Apps.pptx
@@ -80,8 +80,12 @@
     <p:sldId id="336" r:id="rId74"/>
     <p:sldId id="288" r:id="rId75"/>
     <p:sldId id="289" r:id="rId76"/>
-    <p:sldId id="286" r:id="rId77"/>
-    <p:sldId id="265" r:id="rId78"/>
+    <p:sldId id="338" r:id="rId77"/>
+    <p:sldId id="339" r:id="rId78"/>
+    <p:sldId id="341" r:id="rId79"/>
+    <p:sldId id="340" r:id="rId80"/>
+    <p:sldId id="286" r:id="rId81"/>
+    <p:sldId id="265" r:id="rId82"/>
   </p:sldIdLst>
   <p:sldSz cx="12192000" cy="6858000"/>
   <p:notesSz cx="6858000" cy="9144000"/>
@@ -272,6 +276,10 @@
           <p14:sldIdLst>
             <p14:sldId id="288"/>
             <p14:sldId id="289"/>
+            <p14:sldId id="338"/>
+            <p14:sldId id="339"/>
+            <p14:sldId id="341"/>
+            <p14:sldId id="340"/>
             <p14:sldId id="286"/>
             <p14:sldId id="265"/>
           </p14:sldIdLst>
@@ -3989,7 +3997,7 @@
           <a:p>
             <a:fld id="{79699155-1715-4116-AA3E-91126DDAD825}" type="datetimeFigureOut">
               <a:rPr lang="de-AT" smtClean="0"/>
-              <a:t>28.04.2022</a:t>
+              <a:t>03.05.2022</a:t>
             </a:fld>
             <a:endParaRPr lang="de-AT"/>
           </a:p>
@@ -4159,7 +4167,7 @@
           <a:p>
             <a:fld id="{79699155-1715-4116-AA3E-91126DDAD825}" type="datetimeFigureOut">
               <a:rPr lang="de-AT" smtClean="0"/>
-              <a:t>28.04.2022</a:t>
+              <a:t>03.05.2022</a:t>
             </a:fld>
             <a:endParaRPr lang="de-AT"/>
           </a:p>
@@ -4339,7 +4347,7 @@
           <a:p>
             <a:fld id="{79699155-1715-4116-AA3E-91126DDAD825}" type="datetimeFigureOut">
               <a:rPr lang="de-AT" smtClean="0"/>
-              <a:t>28.04.2022</a:t>
+              <a:t>03.05.2022</a:t>
             </a:fld>
             <a:endParaRPr lang="de-AT"/>
           </a:p>
@@ -4509,7 +4517,7 @@
           <a:p>
             <a:fld id="{79699155-1715-4116-AA3E-91126DDAD825}" type="datetimeFigureOut">
               <a:rPr lang="de-AT" smtClean="0"/>
-              <a:t>28.04.2022</a:t>
+              <a:t>03.05.2022</a:t>
             </a:fld>
             <a:endParaRPr lang="de-AT"/>
           </a:p>
@@ -4755,7 +4763,7 @@
           <a:p>
             <a:fld id="{79699155-1715-4116-AA3E-91126DDAD825}" type="datetimeFigureOut">
               <a:rPr lang="de-AT" smtClean="0"/>
-              <a:t>28.04.2022</a:t>
+              <a:t>03.05.2022</a:t>
             </a:fld>
             <a:endParaRPr lang="de-AT"/>
           </a:p>
@@ -4987,7 +4995,7 @@
           <a:p>
             <a:fld id="{79699155-1715-4116-AA3E-91126DDAD825}" type="datetimeFigureOut">
               <a:rPr lang="de-AT" smtClean="0"/>
-              <a:t>28.04.2022</a:t>
+              <a:t>03.05.2022</a:t>
             </a:fld>
             <a:endParaRPr lang="de-AT"/>
           </a:p>
@@ -5354,7 +5362,7 @@
           <a:p>
             <a:fld id="{79699155-1715-4116-AA3E-91126DDAD825}" type="datetimeFigureOut">
               <a:rPr lang="de-AT" smtClean="0"/>
-              <a:t>28.04.2022</a:t>
+              <a:t>03.05.2022</a:t>
             </a:fld>
             <a:endParaRPr lang="de-AT"/>
           </a:p>
@@ -5472,7 +5480,7 @@
           <a:p>
             <a:fld id="{79699155-1715-4116-AA3E-91126DDAD825}" type="datetimeFigureOut">
               <a:rPr lang="de-AT" smtClean="0"/>
-              <a:t>28.04.2022</a:t>
+              <a:t>03.05.2022</a:t>
             </a:fld>
             <a:endParaRPr lang="de-AT"/>
           </a:p>
@@ -5567,7 +5575,7 @@
           <a:p>
             <a:fld id="{79699155-1715-4116-AA3E-91126DDAD825}" type="datetimeFigureOut">
               <a:rPr lang="de-AT" smtClean="0"/>
-              <a:t>28.04.2022</a:t>
+              <a:t>03.05.2022</a:t>
             </a:fld>
             <a:endParaRPr lang="de-AT"/>
           </a:p>
@@ -5844,7 +5852,7 @@
           <a:p>
             <a:fld id="{79699155-1715-4116-AA3E-91126DDAD825}" type="datetimeFigureOut">
               <a:rPr lang="de-AT" smtClean="0"/>
-              <a:t>28.04.2022</a:t>
+              <a:t>03.05.2022</a:t>
             </a:fld>
             <a:endParaRPr lang="de-AT"/>
           </a:p>
@@ -6097,7 +6105,7 @@
           <a:p>
             <a:fld id="{79699155-1715-4116-AA3E-91126DDAD825}" type="datetimeFigureOut">
               <a:rPr lang="de-AT" smtClean="0"/>
-              <a:t>28.04.2022</a:t>
+              <a:t>03.05.2022</a:t>
             </a:fld>
             <a:endParaRPr lang="de-AT"/>
           </a:p>
@@ -6310,7 +6318,7 @@
           <a:p>
             <a:fld id="{79699155-1715-4116-AA3E-91126DDAD825}" type="datetimeFigureOut">
               <a:rPr lang="de-AT" smtClean="0"/>
-              <a:t>28.04.2022</a:t>
+              <a:t>03.05.2022</a:t>
             </a:fld>
             <a:endParaRPr lang="de-AT"/>
           </a:p>
@@ -6837,21 +6845,21 @@
                 <a:gridCol w="1804416">
                   <a:extLst>
                     <a:ext uri="{9D8B030D-6E8A-4147-A177-3AD203B41FA5}">
-                      <a16:colId xmlns:a16="http://schemas.microsoft.com/office/drawing/2014/main" xmlns="" val="20000"/>
+                      <a16:colId xmlns="" xmlns:a16="http://schemas.microsoft.com/office/drawing/2014/main" val="20000"/>
                     </a:ext>
                   </a:extLst>
                 </a:gridCol>
                 <a:gridCol w="3936492">
                   <a:extLst>
                     <a:ext uri="{9D8B030D-6E8A-4147-A177-3AD203B41FA5}">
-                      <a16:colId xmlns:a16="http://schemas.microsoft.com/office/drawing/2014/main" xmlns="" val="20001"/>
+                      <a16:colId xmlns="" xmlns:a16="http://schemas.microsoft.com/office/drawing/2014/main" val="20001"/>
                     </a:ext>
                   </a:extLst>
                 </a:gridCol>
                 <a:gridCol w="4774692">
                   <a:extLst>
                     <a:ext uri="{9D8B030D-6E8A-4147-A177-3AD203B41FA5}">
-                      <a16:colId xmlns:a16="http://schemas.microsoft.com/office/drawing/2014/main" xmlns="" val="20002"/>
+                      <a16:colId xmlns="" xmlns:a16="http://schemas.microsoft.com/office/drawing/2014/main" val="20002"/>
                     </a:ext>
                   </a:extLst>
                 </a:gridCol>
@@ -6989,7 +6997,7 @@
                 </a:tc>
                 <a:extLst>
                   <a:ext uri="{0D108BD9-81ED-4DB2-BD59-A6C34878D82A}">
-                    <a16:rowId xmlns:a16="http://schemas.microsoft.com/office/drawing/2014/main" xmlns="" val="10000"/>
+                    <a16:rowId xmlns="" xmlns:a16="http://schemas.microsoft.com/office/drawing/2014/main" val="10000"/>
                   </a:ext>
                 </a:extLst>
               </a:tr>
@@ -7128,7 +7136,7 @@
                 </a:tc>
                 <a:extLst>
                   <a:ext uri="{0D108BD9-81ED-4DB2-BD59-A6C34878D82A}">
-                    <a16:rowId xmlns:a16="http://schemas.microsoft.com/office/drawing/2014/main" xmlns="" val="10001"/>
+                    <a16:rowId xmlns="" xmlns:a16="http://schemas.microsoft.com/office/drawing/2014/main" val="10001"/>
                   </a:ext>
                 </a:extLst>
               </a:tr>
@@ -7272,7 +7280,7 @@
                 </a:tc>
                 <a:extLst>
                   <a:ext uri="{0D108BD9-81ED-4DB2-BD59-A6C34878D82A}">
-                    <a16:rowId xmlns:a16="http://schemas.microsoft.com/office/drawing/2014/main" xmlns="" val="10002"/>
+                    <a16:rowId xmlns="" xmlns:a16="http://schemas.microsoft.com/office/drawing/2014/main" val="10002"/>
                   </a:ext>
                 </a:extLst>
               </a:tr>
@@ -7422,7 +7430,7 @@
                 </a:tc>
                 <a:extLst>
                   <a:ext uri="{0D108BD9-81ED-4DB2-BD59-A6C34878D82A}">
-                    <a16:rowId xmlns:a16="http://schemas.microsoft.com/office/drawing/2014/main" xmlns="" val="10003"/>
+                    <a16:rowId xmlns="" xmlns:a16="http://schemas.microsoft.com/office/drawing/2014/main" val="10003"/>
                   </a:ext>
                 </a:extLst>
               </a:tr>
@@ -13139,14 +13147,14 @@
                 <a:gridCol w="3101961">
                   <a:extLst>
                     <a:ext uri="{9D8B030D-6E8A-4147-A177-3AD203B41FA5}">
-                      <a16:colId xmlns:a16="http://schemas.microsoft.com/office/drawing/2014/main" xmlns="" val="20000"/>
+                      <a16:colId xmlns="" xmlns:a16="http://schemas.microsoft.com/office/drawing/2014/main" val="20000"/>
                     </a:ext>
                   </a:extLst>
                 </a:gridCol>
                 <a:gridCol w="7413639">
                   <a:extLst>
                     <a:ext uri="{9D8B030D-6E8A-4147-A177-3AD203B41FA5}">
-                      <a16:colId xmlns:a16="http://schemas.microsoft.com/office/drawing/2014/main" xmlns="" val="20001"/>
+                      <a16:colId xmlns="" xmlns:a16="http://schemas.microsoft.com/office/drawing/2014/main" val="20001"/>
                     </a:ext>
                   </a:extLst>
                 </a:gridCol>
@@ -13180,7 +13188,7 @@
                 </a:tc>
                 <a:extLst>
                   <a:ext uri="{0D108BD9-81ED-4DB2-BD59-A6C34878D82A}">
-                    <a16:rowId xmlns:a16="http://schemas.microsoft.com/office/drawing/2014/main" xmlns="" val="10000"/>
+                    <a16:rowId xmlns="" xmlns:a16="http://schemas.microsoft.com/office/drawing/2014/main" val="10000"/>
                   </a:ext>
                 </a:extLst>
               </a:tr>
@@ -13266,7 +13274,7 @@
                 </a:tc>
                 <a:extLst>
                   <a:ext uri="{0D108BD9-81ED-4DB2-BD59-A6C34878D82A}">
-                    <a16:rowId xmlns:a16="http://schemas.microsoft.com/office/drawing/2014/main" xmlns="" val="10001"/>
+                    <a16:rowId xmlns="" xmlns:a16="http://schemas.microsoft.com/office/drawing/2014/main" val="10001"/>
                   </a:ext>
                 </a:extLst>
               </a:tr>
@@ -13324,7 +13332,7 @@
                 </a:tc>
                 <a:extLst>
                   <a:ext uri="{0D108BD9-81ED-4DB2-BD59-A6C34878D82A}">
-                    <a16:rowId xmlns:a16="http://schemas.microsoft.com/office/drawing/2014/main" xmlns="" val="10002"/>
+                    <a16:rowId xmlns="" xmlns:a16="http://schemas.microsoft.com/office/drawing/2014/main" val="10002"/>
                   </a:ext>
                 </a:extLst>
               </a:tr>
@@ -13391,7 +13399,7 @@
                 </a:tc>
                 <a:extLst>
                   <a:ext uri="{0D108BD9-81ED-4DB2-BD59-A6C34878D82A}">
-                    <a16:rowId xmlns:a16="http://schemas.microsoft.com/office/drawing/2014/main" xmlns="" val="10003"/>
+                    <a16:rowId xmlns="" xmlns:a16="http://schemas.microsoft.com/office/drawing/2014/main" val="10003"/>
                   </a:ext>
                 </a:extLst>
               </a:tr>
@@ -13482,7 +13490,7 @@
                 </a:tc>
                 <a:extLst>
                   <a:ext uri="{0D108BD9-81ED-4DB2-BD59-A6C34878D82A}">
-                    <a16:rowId xmlns:a16="http://schemas.microsoft.com/office/drawing/2014/main" xmlns="" val="10004"/>
+                    <a16:rowId xmlns="" xmlns:a16="http://schemas.microsoft.com/office/drawing/2014/main" val="10004"/>
                   </a:ext>
                 </a:extLst>
               </a:tr>
@@ -13512,7 +13520,7 @@
                 </a:tc>
                 <a:extLst>
                   <a:ext uri="{0D108BD9-81ED-4DB2-BD59-A6C34878D82A}">
-                    <a16:rowId xmlns:a16="http://schemas.microsoft.com/office/drawing/2014/main" xmlns="" val="10005"/>
+                    <a16:rowId xmlns="" xmlns:a16="http://schemas.microsoft.com/office/drawing/2014/main" val="10005"/>
                   </a:ext>
                 </a:extLst>
               </a:tr>
@@ -17863,7 +17871,7 @@
           <p:cNvPr id="2" name="Titel 1">
             <a:extLst>
               <a:ext uri="{FF2B5EF4-FFF2-40B4-BE49-F238E27FC236}">
-                <a16:creationId xmlns:a16="http://schemas.microsoft.com/office/drawing/2014/main" xmlns="" id="{7C74C4CE-CEBC-4725-9C59-28B4B7B750F9}"/>
+                <a16:creationId xmlns="" xmlns:a16="http://schemas.microsoft.com/office/drawing/2014/main" id="{7C74C4CE-CEBC-4725-9C59-28B4B7B750F9}"/>
               </a:ext>
             </a:extLst>
           </p:cNvPr>
@@ -17892,7 +17900,7 @@
           <p:cNvPr id="3" name="Inhaltsplatzhalter 2">
             <a:extLst>
               <a:ext uri="{FF2B5EF4-FFF2-40B4-BE49-F238E27FC236}">
-                <a16:creationId xmlns:a16="http://schemas.microsoft.com/office/drawing/2014/main" xmlns="" id="{8433872D-38EC-42CA-9561-0492F1E3670E}"/>
+                <a16:creationId xmlns="" xmlns:a16="http://schemas.microsoft.com/office/drawing/2014/main" id="{8433872D-38EC-42CA-9561-0492F1E3670E}"/>
               </a:ext>
             </a:extLst>
           </p:cNvPr>
@@ -27459,21 +27467,21 @@
                 <a:gridCol w="3505200">
                   <a:extLst>
                     <a:ext uri="{9D8B030D-6E8A-4147-A177-3AD203B41FA5}">
-                      <a16:colId xmlns:a16="http://schemas.microsoft.com/office/drawing/2014/main" xmlns="" val="20000"/>
+                      <a16:colId xmlns="" xmlns:a16="http://schemas.microsoft.com/office/drawing/2014/main" val="20000"/>
                     </a:ext>
                   </a:extLst>
                 </a:gridCol>
                 <a:gridCol w="3505200">
                   <a:extLst>
                     <a:ext uri="{9D8B030D-6E8A-4147-A177-3AD203B41FA5}">
-                      <a16:colId xmlns:a16="http://schemas.microsoft.com/office/drawing/2014/main" xmlns="" val="20001"/>
+                      <a16:colId xmlns="" xmlns:a16="http://schemas.microsoft.com/office/drawing/2014/main" val="20001"/>
                     </a:ext>
                   </a:extLst>
                 </a:gridCol>
                 <a:gridCol w="3505200">
                   <a:extLst>
                     <a:ext uri="{9D8B030D-6E8A-4147-A177-3AD203B41FA5}">
-                      <a16:colId xmlns:a16="http://schemas.microsoft.com/office/drawing/2014/main" xmlns="" val="20002"/>
+                      <a16:colId xmlns="" xmlns:a16="http://schemas.microsoft.com/office/drawing/2014/main" val="20002"/>
                     </a:ext>
                   </a:extLst>
                 </a:gridCol>
@@ -27528,7 +27536,7 @@
                 </a:tc>
                 <a:extLst>
                   <a:ext uri="{0D108BD9-81ED-4DB2-BD59-A6C34878D82A}">
-                    <a16:rowId xmlns:a16="http://schemas.microsoft.com/office/drawing/2014/main" xmlns="" val="10000"/>
+                    <a16:rowId xmlns="" xmlns:a16="http://schemas.microsoft.com/office/drawing/2014/main" val="10000"/>
                   </a:ext>
                 </a:extLst>
               </a:tr>
@@ -27615,7 +27623,7 @@
                 </a:tc>
                 <a:extLst>
                   <a:ext uri="{0D108BD9-81ED-4DB2-BD59-A6C34878D82A}">
-                    <a16:rowId xmlns:a16="http://schemas.microsoft.com/office/drawing/2014/main" xmlns="" val="10001"/>
+                    <a16:rowId xmlns="" xmlns:a16="http://schemas.microsoft.com/office/drawing/2014/main" val="10001"/>
                   </a:ext>
                 </a:extLst>
               </a:tr>
@@ -27716,7 +27724,7 @@
                 </a:tc>
                 <a:extLst>
                   <a:ext uri="{0D108BD9-81ED-4DB2-BD59-A6C34878D82A}">
-                    <a16:rowId xmlns:a16="http://schemas.microsoft.com/office/drawing/2014/main" xmlns="" val="10002"/>
+                    <a16:rowId xmlns="" xmlns:a16="http://schemas.microsoft.com/office/drawing/2014/main" val="10002"/>
                   </a:ext>
                 </a:extLst>
               </a:tr>
@@ -27808,7 +27816,7 @@
                 </a:tc>
                 <a:extLst>
                   <a:ext uri="{0D108BD9-81ED-4DB2-BD59-A6C34878D82A}">
-                    <a16:rowId xmlns:a16="http://schemas.microsoft.com/office/drawing/2014/main" xmlns="" val="10003"/>
+                    <a16:rowId xmlns="" xmlns:a16="http://schemas.microsoft.com/office/drawing/2014/main" val="10003"/>
                   </a:ext>
                 </a:extLst>
               </a:tr>
@@ -30327,9 +30335,8 @@
             <a:r>
               <a:rPr lang="de-AT" dirty="0">
                 <a:solidFill>
-                  <a:schemeClr val="accent6">
-                    <a:lumMod val="60000"/>
-                    <a:lumOff val="40000"/>
+                  <a:schemeClr val="bg2">
+                    <a:lumMod val="90000"/>
                   </a:schemeClr>
                 </a:solidFill>
               </a:rPr>
@@ -30338,9 +30345,8 @@
             <a:r>
               <a:rPr lang="de-AT" dirty="0" err="1">
                 <a:solidFill>
-                  <a:schemeClr val="accent6">
-                    <a:lumMod val="60000"/>
-                    <a:lumOff val="40000"/>
+                  <a:schemeClr val="bg2">
+                    <a:lumMod val="90000"/>
                   </a:schemeClr>
                 </a:solidFill>
               </a:rPr>
@@ -30349,9 +30355,8 @@
             <a:r>
               <a:rPr lang="de-AT" dirty="0">
                 <a:solidFill>
-                  <a:schemeClr val="accent6">
-                    <a:lumMod val="60000"/>
-                    <a:lumOff val="40000"/>
+                  <a:schemeClr val="bg2">
+                    <a:lumMod val="90000"/>
                   </a:schemeClr>
                 </a:solidFill>
               </a:rPr>
@@ -30455,9 +30460,22 @@
           <a:lstStyle/>
           <a:p>
             <a:r>
-              <a:rPr lang="de-AT" dirty="0"/>
-              <a:t>Outline</a:t>
-            </a:r>
+              <a:rPr lang="de-AT" dirty="0" smtClean="0"/>
+              <a:t>Native </a:t>
+            </a:r>
+            <a:r>
+              <a:rPr lang="de-AT" dirty="0" err="1" smtClean="0"/>
+              <a:t>device</a:t>
+            </a:r>
+            <a:r>
+              <a:rPr lang="de-AT" dirty="0" smtClean="0"/>
+              <a:t> </a:t>
+            </a:r>
+            <a:r>
+              <a:rPr lang="de-AT" dirty="0" err="1" smtClean="0"/>
+              <a:t>features</a:t>
+            </a:r>
+            <a:endParaRPr lang="de-AT" dirty="0"/>
           </a:p>
         </p:txBody>
       </p:sp>
@@ -30473,374 +30491,87 @@
         </p:nvSpPr>
         <p:spPr/>
         <p:txBody>
-          <a:bodyPr>
-            <a:normAutofit lnSpcReduction="10000"/>
-          </a:bodyPr>
+          <a:bodyPr/>
           <a:lstStyle/>
           <a:p>
-            <a:pPr marL="514350" indent="-514350">
-              <a:buFont typeface="+mj-lt"/>
-              <a:buAutoNum type="arabicPeriod"/>
+            <a:r>
+              <a:rPr lang="de-AT" dirty="0" err="1" smtClean="0"/>
+              <a:t>What</a:t>
+            </a:r>
+            <a:r>
+              <a:rPr lang="de-AT" dirty="0" smtClean="0"/>
+              <a:t> </a:t>
+            </a:r>
+            <a:r>
+              <a:rPr lang="de-AT" dirty="0" err="1" smtClean="0"/>
+              <a:t>are</a:t>
+            </a:r>
+            <a:r>
+              <a:rPr lang="de-AT" dirty="0" smtClean="0"/>
+              <a:t> native </a:t>
+            </a:r>
+            <a:r>
+              <a:rPr lang="de-AT" dirty="0" err="1" smtClean="0"/>
+              <a:t>device</a:t>
+            </a:r>
+            <a:r>
+              <a:rPr lang="de-AT" dirty="0" smtClean="0"/>
+              <a:t> </a:t>
+            </a:r>
+            <a:r>
+              <a:rPr lang="de-AT" dirty="0" err="1" smtClean="0"/>
+              <a:t>features</a:t>
+            </a:r>
+            <a:r>
+              <a:rPr lang="de-AT" dirty="0" smtClean="0"/>
+              <a:t>?</a:t>
+            </a:r>
+          </a:p>
+          <a:p>
+            <a:pPr lvl="1"/>
+            <a:r>
+              <a:rPr lang="de-AT" dirty="0" err="1" smtClean="0"/>
+              <a:t>Camera</a:t>
+            </a:r>
+            <a:r>
+              <a:rPr lang="de-AT" dirty="0" smtClean="0"/>
+              <a:t>, </a:t>
+            </a:r>
+            <a:r>
+              <a:rPr lang="de-AT" dirty="0" err="1" smtClean="0"/>
+              <a:t>Geolocation</a:t>
+            </a:r>
+            <a:r>
+              <a:rPr lang="de-AT" dirty="0" smtClean="0"/>
+              <a:t>, </a:t>
+            </a:r>
+            <a:r>
+              <a:rPr lang="de-AT" dirty="0" err="1" smtClean="0"/>
+              <a:t>Compass</a:t>
+            </a:r>
+            <a:r>
+              <a:rPr lang="de-AT" dirty="0" smtClean="0"/>
+              <a:t>…</a:t>
+            </a:r>
+          </a:p>
+          <a:p>
+            <a:endParaRPr lang="de-AT" dirty="0" smtClean="0"/>
+          </a:p>
+          <a:p>
+            <a:pPr marL="457200" lvl="1" indent="0">
+              <a:buNone/>
             </a:pPr>
             <a:r>
-              <a:rPr lang="de-AT" dirty="0">
-                <a:solidFill>
-                  <a:schemeClr val="accent6">
-                    <a:lumMod val="60000"/>
-                    <a:lumOff val="40000"/>
-                  </a:schemeClr>
-                </a:solidFill>
-              </a:rPr>
-              <a:t>Basics</a:t>
-            </a:r>
-          </a:p>
-          <a:p>
-            <a:pPr marL="971550" lvl="1" indent="-514350">
-              <a:buFont typeface="+mj-lt"/>
-              <a:buAutoNum type="arabicPeriod"/>
-            </a:pPr>
-            <a:r>
-              <a:rPr lang="de-AT" dirty="0">
-                <a:solidFill>
-                  <a:schemeClr val="accent6">
-                    <a:lumMod val="60000"/>
-                    <a:lumOff val="40000"/>
-                  </a:schemeClr>
-                </a:solidFill>
-              </a:rPr>
-              <a:t>App Manifest </a:t>
-            </a:r>
-          </a:p>
-          <a:p>
-            <a:pPr marL="971550" lvl="1" indent="-514350">
-              <a:buFont typeface="+mj-lt"/>
-              <a:buAutoNum type="arabicPeriod"/>
-            </a:pPr>
-            <a:r>
-              <a:rPr lang="de-AT" dirty="0">
-                <a:solidFill>
-                  <a:schemeClr val="accent6">
-                    <a:lumMod val="60000"/>
-                    <a:lumOff val="40000"/>
-                  </a:schemeClr>
-                </a:solidFill>
-              </a:rPr>
-              <a:t>Service </a:t>
-            </a:r>
-            <a:r>
-              <a:rPr lang="de-AT" dirty="0" err="1">
-                <a:solidFill>
-                  <a:schemeClr val="accent6">
-                    <a:lumMod val="60000"/>
-                    <a:lumOff val="40000"/>
-                  </a:schemeClr>
-                </a:solidFill>
-              </a:rPr>
-              <a:t>Workers</a:t>
-            </a:r>
-            <a:endParaRPr lang="de-AT" dirty="0">
-              <a:solidFill>
-                <a:schemeClr val="accent6">
-                  <a:lumMod val="60000"/>
-                  <a:lumOff val="40000"/>
-                </a:schemeClr>
-              </a:solidFill>
-            </a:endParaRPr>
-          </a:p>
-          <a:p>
-            <a:pPr marL="971550" lvl="1" indent="-514350">
-              <a:buFont typeface="+mj-lt"/>
-              <a:buAutoNum type="arabicPeriod"/>
-            </a:pPr>
-            <a:r>
-              <a:rPr lang="de-AT" dirty="0">
-                <a:solidFill>
-                  <a:schemeClr val="accent6">
-                    <a:lumMod val="60000"/>
-                    <a:lumOff val="40000"/>
-                  </a:schemeClr>
-                </a:solidFill>
-              </a:rPr>
-              <a:t>Installation</a:t>
-            </a:r>
-          </a:p>
-          <a:p>
-            <a:pPr marL="514350" indent="-514350">
-              <a:buFont typeface="+mj-lt"/>
-              <a:buAutoNum type="arabicPeriod"/>
-            </a:pPr>
-            <a:r>
-              <a:rPr lang="de-AT" dirty="0" err="1">
-                <a:solidFill>
-                  <a:schemeClr val="accent6">
-                    <a:lumMod val="60000"/>
-                    <a:lumOff val="40000"/>
-                  </a:schemeClr>
-                </a:solidFill>
-              </a:rPr>
-              <a:t>Promise</a:t>
-            </a:r>
-            <a:r>
-              <a:rPr lang="de-AT" dirty="0">
-                <a:solidFill>
-                  <a:schemeClr val="accent6">
-                    <a:lumMod val="60000"/>
-                    <a:lumOff val="40000"/>
-                  </a:schemeClr>
-                </a:solidFill>
-              </a:rPr>
-              <a:t> </a:t>
-            </a:r>
-            <a:r>
-              <a:rPr lang="de-AT" dirty="0" err="1">
-                <a:solidFill>
-                  <a:schemeClr val="accent6">
-                    <a:lumMod val="60000"/>
-                    <a:lumOff val="40000"/>
-                  </a:schemeClr>
-                </a:solidFill>
-              </a:rPr>
-              <a:t>and</a:t>
-            </a:r>
-            <a:r>
-              <a:rPr lang="de-AT" dirty="0">
-                <a:solidFill>
-                  <a:schemeClr val="accent6">
-                    <a:lumMod val="60000"/>
-                    <a:lumOff val="40000"/>
-                  </a:schemeClr>
-                </a:solidFill>
-              </a:rPr>
-              <a:t> </a:t>
-            </a:r>
-            <a:r>
-              <a:rPr lang="de-AT" dirty="0" err="1">
-                <a:solidFill>
-                  <a:schemeClr val="accent6">
-                    <a:lumMod val="60000"/>
-                    <a:lumOff val="40000"/>
-                  </a:schemeClr>
-                </a:solidFill>
-              </a:rPr>
-              <a:t>Fetch</a:t>
-            </a:r>
-            <a:r>
-              <a:rPr lang="de-AT" dirty="0">
-                <a:solidFill>
-                  <a:schemeClr val="accent6">
-                    <a:lumMod val="60000"/>
-                    <a:lumOff val="40000"/>
-                  </a:schemeClr>
-                </a:solidFill>
-              </a:rPr>
-              <a:t>, Service Worker Caching</a:t>
-            </a:r>
-          </a:p>
-          <a:p>
-            <a:pPr marL="514350" indent="-514350">
-              <a:buFont typeface="+mj-lt"/>
-              <a:buAutoNum type="arabicPeriod"/>
-            </a:pPr>
-            <a:r>
-              <a:rPr lang="de-AT" dirty="0" err="1">
-                <a:solidFill>
-                  <a:schemeClr val="accent6">
-                    <a:lumMod val="60000"/>
-                    <a:lumOff val="40000"/>
-                  </a:schemeClr>
-                </a:solidFill>
-              </a:rPr>
-              <a:t>Advanced</a:t>
-            </a:r>
-            <a:r>
-              <a:rPr lang="de-AT" dirty="0">
-                <a:solidFill>
-                  <a:schemeClr val="accent6">
-                    <a:lumMod val="60000"/>
-                    <a:lumOff val="40000"/>
-                  </a:schemeClr>
-                </a:solidFill>
-              </a:rPr>
-              <a:t> Caching, </a:t>
-            </a:r>
-            <a:r>
-              <a:rPr lang="de-AT" dirty="0" err="1">
-                <a:solidFill>
-                  <a:schemeClr val="accent6">
-                    <a:lumMod val="60000"/>
-                    <a:lumOff val="40000"/>
-                  </a:schemeClr>
-                </a:solidFill>
-              </a:rPr>
-              <a:t>Indexed</a:t>
-            </a:r>
-            <a:r>
-              <a:rPr lang="de-AT" dirty="0">
-                <a:solidFill>
-                  <a:schemeClr val="accent6">
-                    <a:lumMod val="60000"/>
-                    <a:lumOff val="40000"/>
-                  </a:schemeClr>
-                </a:solidFill>
-              </a:rPr>
-              <a:t> DB </a:t>
-            </a:r>
-            <a:r>
-              <a:rPr lang="de-AT" dirty="0" err="1">
-                <a:solidFill>
-                  <a:schemeClr val="accent6">
-                    <a:lumMod val="60000"/>
-                    <a:lumOff val="40000"/>
-                  </a:schemeClr>
-                </a:solidFill>
-              </a:rPr>
-              <a:t>and</a:t>
-            </a:r>
-            <a:r>
-              <a:rPr lang="de-AT" dirty="0">
-                <a:solidFill>
-                  <a:schemeClr val="accent6">
-                    <a:lumMod val="60000"/>
-                    <a:lumOff val="40000"/>
-                  </a:schemeClr>
-                </a:solidFill>
-              </a:rPr>
-              <a:t> Dynamic Data</a:t>
-            </a:r>
-          </a:p>
-          <a:p>
-            <a:pPr marL="514350" indent="-514350">
-              <a:buFont typeface="+mj-lt"/>
-              <a:buAutoNum type="arabicPeriod"/>
-            </a:pPr>
-            <a:r>
-              <a:rPr lang="de-AT" dirty="0" err="1">
-                <a:solidFill>
-                  <a:schemeClr val="accent6">
-                    <a:lumMod val="60000"/>
-                    <a:lumOff val="40000"/>
-                  </a:schemeClr>
-                </a:solidFill>
-              </a:rPr>
-              <a:t>Responsive</a:t>
-            </a:r>
-            <a:r>
-              <a:rPr lang="de-AT" dirty="0">
-                <a:solidFill>
-                  <a:schemeClr val="accent6">
-                    <a:lumMod val="60000"/>
-                    <a:lumOff val="40000"/>
-                  </a:schemeClr>
-                </a:solidFill>
-              </a:rPr>
-              <a:t> UI, Background </a:t>
-            </a:r>
-            <a:r>
-              <a:rPr lang="de-AT" dirty="0" err="1">
-                <a:solidFill>
-                  <a:schemeClr val="accent6">
-                    <a:lumMod val="60000"/>
-                    <a:lumOff val="40000"/>
-                  </a:schemeClr>
-                </a:solidFill>
-              </a:rPr>
-              <a:t>Sync</a:t>
-            </a:r>
-            <a:r>
-              <a:rPr lang="de-AT" dirty="0">
-                <a:solidFill>
-                  <a:schemeClr val="accent6">
-                    <a:lumMod val="60000"/>
-                    <a:lumOff val="40000"/>
-                  </a:schemeClr>
-                </a:solidFill>
-              </a:rPr>
-              <a:t> </a:t>
-            </a:r>
-          </a:p>
-          <a:p>
-            <a:pPr marL="514350" indent="-514350">
-              <a:buFont typeface="+mj-lt"/>
-              <a:buAutoNum type="arabicPeriod"/>
-            </a:pPr>
-            <a:r>
-              <a:rPr lang="de-AT" dirty="0">
-                <a:solidFill>
-                  <a:schemeClr val="accent6">
-                    <a:lumMod val="60000"/>
-                    <a:lumOff val="40000"/>
-                  </a:schemeClr>
-                </a:solidFill>
-              </a:rPr>
-              <a:t>Web Push </a:t>
-            </a:r>
-            <a:r>
-              <a:rPr lang="de-AT" dirty="0" err="1">
-                <a:solidFill>
-                  <a:schemeClr val="accent6">
-                    <a:lumMod val="60000"/>
-                    <a:lumOff val="40000"/>
-                  </a:schemeClr>
-                </a:solidFill>
-              </a:rPr>
-              <a:t>Notifications</a:t>
-            </a:r>
-            <a:r>
-              <a:rPr lang="de-AT" dirty="0">
-                <a:solidFill>
-                  <a:schemeClr val="accent6">
-                    <a:lumMod val="60000"/>
-                    <a:lumOff val="40000"/>
-                  </a:schemeClr>
-                </a:solidFill>
-              </a:rPr>
-              <a:t> </a:t>
-            </a:r>
-          </a:p>
-          <a:p>
-            <a:pPr marL="514350" indent="-514350">
-              <a:buFont typeface="+mj-lt"/>
-              <a:buAutoNum type="arabicPeriod"/>
-            </a:pPr>
-            <a:r>
-              <a:rPr lang="de-AT" dirty="0">
-                <a:solidFill>
-                  <a:schemeClr val="accent6">
-                    <a:lumMod val="60000"/>
-                    <a:lumOff val="40000"/>
-                  </a:schemeClr>
-                </a:solidFill>
-              </a:rPr>
-              <a:t>Native Device Features</a:t>
-            </a:r>
-          </a:p>
-          <a:p>
-            <a:pPr marL="514350" indent="-514350">
-              <a:buFont typeface="+mj-lt"/>
-              <a:buAutoNum type="arabicPeriod"/>
-            </a:pPr>
-            <a:r>
               <a:rPr lang="de-AT" dirty="0"/>
-              <a:t>Round </a:t>
-            </a:r>
-            <a:r>
-              <a:rPr lang="de-AT" dirty="0" err="1"/>
-              <a:t>Up</a:t>
-            </a:r>
-            <a:r>
-              <a:rPr lang="de-AT" dirty="0"/>
-              <a:t> &amp; Quiz</a:t>
-            </a:r>
-          </a:p>
-          <a:p>
-            <a:endParaRPr lang="de-AT" dirty="0"/>
+              <a:t>	</a:t>
+            </a:r>
           </a:p>
         </p:txBody>
       </p:sp>
     </p:spTree>
     <p:extLst>
       <p:ext uri="{BB962C8B-B14F-4D97-AF65-F5344CB8AC3E}">
-        <p14:creationId xmlns:p14="http://schemas.microsoft.com/office/powerpoint/2010/main" val="2022339406"/>
+        <p14:creationId xmlns:p14="http://schemas.microsoft.com/office/powerpoint/2010/main" val="2663935610"/>
       </p:ext>
     </p:extLst>
   </p:cSld>
@@ -30883,9 +30614,30 @@
           <a:lstStyle/>
           <a:p>
             <a:r>
-              <a:rPr lang="de-AT" dirty="0"/>
-              <a:t>Backend</a:t>
-            </a:r>
+              <a:rPr lang="de-AT" dirty="0" smtClean="0"/>
+              <a:t>Native </a:t>
+            </a:r>
+            <a:r>
+              <a:rPr lang="de-AT" dirty="0" err="1" smtClean="0"/>
+              <a:t>Recipe</a:t>
+            </a:r>
+            <a:r>
+              <a:rPr lang="de-AT" dirty="0" smtClean="0"/>
+              <a:t> </a:t>
+            </a:r>
+            <a:r>
+              <a:rPr lang="de-AT" dirty="0" err="1" smtClean="0"/>
+              <a:t>For</a:t>
+            </a:r>
+            <a:r>
+              <a:rPr lang="de-AT" dirty="0" smtClean="0"/>
+              <a:t> </a:t>
+            </a:r>
+            <a:r>
+              <a:rPr lang="de-AT" dirty="0" err="1" smtClean="0"/>
+              <a:t>Camera</a:t>
+            </a:r>
+            <a:endParaRPr lang="de-AT" dirty="0"/>
           </a:p>
         </p:txBody>
       </p:sp>
@@ -30901,110 +30653,571 @@
         </p:nvSpPr>
         <p:spPr/>
         <p:txBody>
-          <a:bodyPr/>
+          <a:bodyPr>
+            <a:normAutofit/>
+          </a:bodyPr>
           <a:lstStyle/>
           <a:p>
             <a:r>
+              <a:rPr lang="de-AT" dirty="0" smtClean="0"/>
+              <a:t>Add HTML</a:t>
+            </a:r>
+          </a:p>
+          <a:p>
+            <a:pPr lvl="1"/>
+            <a:r>
+              <a:rPr lang="de-AT" dirty="0" smtClean="0"/>
+              <a:t>Video, </a:t>
+            </a:r>
+            <a:r>
+              <a:rPr lang="de-AT" dirty="0" err="1" smtClean="0"/>
+              <a:t>canvas</a:t>
+            </a:r>
+            <a:r>
+              <a:rPr lang="de-AT" dirty="0" smtClean="0"/>
+              <a:t> </a:t>
+            </a:r>
+            <a:r>
+              <a:rPr lang="de-AT" dirty="0" err="1" smtClean="0"/>
+              <a:t>and</a:t>
+            </a:r>
+            <a:r>
+              <a:rPr lang="de-AT" dirty="0" smtClean="0"/>
+              <a:t> </a:t>
+            </a:r>
+            <a:r>
+              <a:rPr lang="de-AT" dirty="0" err="1" smtClean="0"/>
+              <a:t>button</a:t>
+            </a:r>
+            <a:endParaRPr lang="de-AT" dirty="0" smtClean="0"/>
+          </a:p>
+          <a:p>
+            <a:pPr lvl="1"/>
+            <a:r>
+              <a:rPr lang="de-AT" dirty="0" err="1" smtClean="0"/>
+              <a:t>Graceful</a:t>
+            </a:r>
+            <a:r>
+              <a:rPr lang="de-AT" dirty="0" smtClean="0"/>
+              <a:t> </a:t>
+            </a:r>
+            <a:r>
+              <a:rPr lang="de-AT" dirty="0" err="1" smtClean="0"/>
+              <a:t>degrade</a:t>
+            </a:r>
+            <a:r>
+              <a:rPr lang="de-AT" dirty="0" smtClean="0"/>
+              <a:t> </a:t>
+            </a:r>
+            <a:r>
+              <a:rPr lang="de-AT" dirty="0" err="1" smtClean="0"/>
+              <a:t>with</a:t>
+            </a:r>
+            <a:r>
+              <a:rPr lang="de-AT" dirty="0" smtClean="0"/>
+              <a:t> pick </a:t>
+            </a:r>
+            <a:r>
+              <a:rPr lang="de-AT" dirty="0" err="1" smtClean="0"/>
+              <a:t>image</a:t>
+            </a:r>
+            <a:r>
+              <a:rPr lang="de-AT" dirty="0" smtClean="0"/>
+              <a:t> </a:t>
+            </a:r>
+            <a:r>
+              <a:rPr lang="de-AT" dirty="0" err="1" smtClean="0"/>
+              <a:t>instead</a:t>
+            </a:r>
+            <a:endParaRPr lang="de-AT" dirty="0" smtClean="0"/>
+          </a:p>
+          <a:p>
+            <a:r>
+              <a:rPr lang="de-AT" dirty="0" smtClean="0"/>
+              <a:t>Add </a:t>
+            </a:r>
+            <a:r>
+              <a:rPr lang="de-AT" dirty="0" err="1" smtClean="0"/>
+              <a:t>code</a:t>
+            </a:r>
+            <a:endParaRPr lang="de-AT" dirty="0" smtClean="0"/>
+          </a:p>
+          <a:p>
+            <a:pPr lvl="1"/>
+            <a:r>
+              <a:rPr lang="de-AT" dirty="0" err="1" smtClean="0"/>
+              <a:t>Implement</a:t>
+            </a:r>
+            <a:r>
+              <a:rPr lang="de-AT" dirty="0" smtClean="0"/>
+              <a:t> </a:t>
+            </a:r>
+            <a:r>
+              <a:rPr lang="de-AT" dirty="0" err="1" smtClean="0"/>
+              <a:t>getUserMedia</a:t>
+            </a:r>
+            <a:r>
+              <a:rPr lang="de-AT" dirty="0" smtClean="0"/>
+              <a:t> (</a:t>
+            </a:r>
+            <a:r>
+              <a:rPr lang="de-AT" dirty="0" err="1" smtClean="0"/>
+              <a:t>for</a:t>
+            </a:r>
+            <a:r>
+              <a:rPr lang="de-AT" dirty="0" smtClean="0"/>
+              <a:t> all </a:t>
+            </a:r>
+            <a:r>
+              <a:rPr lang="de-AT" dirty="0" err="1" smtClean="0"/>
+              <a:t>browsers</a:t>
+            </a:r>
+            <a:r>
+              <a:rPr lang="de-AT" dirty="0" smtClean="0"/>
+              <a:t>)</a:t>
+            </a:r>
+          </a:p>
+          <a:p>
+            <a:pPr lvl="1"/>
+            <a:r>
+              <a:rPr lang="de-AT" dirty="0" smtClean="0"/>
+              <a:t>Hook </a:t>
+            </a:r>
+            <a:r>
+              <a:rPr lang="de-AT" dirty="0" err="1" smtClean="0"/>
+              <a:t>stream</a:t>
+            </a:r>
+            <a:r>
+              <a:rPr lang="de-AT" dirty="0" smtClean="0"/>
+              <a:t> </a:t>
+            </a:r>
+            <a:r>
+              <a:rPr lang="de-AT" dirty="0" err="1" smtClean="0"/>
+              <a:t>to</a:t>
+            </a:r>
+            <a:r>
+              <a:rPr lang="de-AT" dirty="0" smtClean="0"/>
+              <a:t> </a:t>
+            </a:r>
+            <a:r>
+              <a:rPr lang="de-AT" dirty="0" err="1" smtClean="0"/>
+              <a:t>canvas</a:t>
+            </a:r>
+            <a:r>
+              <a:rPr lang="de-AT" dirty="0" smtClean="0"/>
+              <a:t> </a:t>
+            </a:r>
+            <a:r>
+              <a:rPr lang="de-AT" dirty="0" err="1" smtClean="0"/>
+              <a:t>with</a:t>
+            </a:r>
+            <a:r>
+              <a:rPr lang="de-AT" dirty="0" smtClean="0"/>
+              <a:t> </a:t>
+            </a:r>
+            <a:r>
+              <a:rPr lang="de-AT" dirty="0" err="1" smtClean="0"/>
+              <a:t>capture</a:t>
+            </a:r>
+            <a:r>
+              <a:rPr lang="de-AT" dirty="0" smtClean="0"/>
+              <a:t> </a:t>
+            </a:r>
+            <a:r>
+              <a:rPr lang="de-AT" dirty="0" err="1" smtClean="0"/>
+              <a:t>button</a:t>
+            </a:r>
+            <a:endParaRPr lang="de-AT" dirty="0" smtClean="0"/>
+          </a:p>
+          <a:p>
+            <a:pPr lvl="1"/>
+            <a:r>
+              <a:rPr lang="de-AT" dirty="0" smtClean="0">
+                <a:solidFill>
+                  <a:schemeClr val="bg2">
+                    <a:lumMod val="90000"/>
+                  </a:schemeClr>
+                </a:solidFill>
+              </a:rPr>
+              <a:t>Upload </a:t>
+            </a:r>
+            <a:r>
+              <a:rPr lang="de-AT" dirty="0" err="1" smtClean="0">
+                <a:solidFill>
+                  <a:schemeClr val="bg2">
+                    <a:lumMod val="90000"/>
+                  </a:schemeClr>
+                </a:solidFill>
+              </a:rPr>
+              <a:t>image</a:t>
+            </a:r>
+            <a:r>
+              <a:rPr lang="de-AT" dirty="0" smtClean="0">
+                <a:solidFill>
+                  <a:schemeClr val="bg2">
+                    <a:lumMod val="90000"/>
+                  </a:schemeClr>
+                </a:solidFill>
+              </a:rPr>
+              <a:t> </a:t>
+            </a:r>
+            <a:r>
+              <a:rPr lang="de-AT" dirty="0" err="1" smtClean="0">
+                <a:solidFill>
+                  <a:schemeClr val="bg2">
+                    <a:lumMod val="90000"/>
+                  </a:schemeClr>
+                </a:solidFill>
+              </a:rPr>
+              <a:t>to</a:t>
+            </a:r>
+            <a:r>
+              <a:rPr lang="de-AT" dirty="0" smtClean="0">
+                <a:solidFill>
+                  <a:schemeClr val="bg2">
+                    <a:lumMod val="90000"/>
+                  </a:schemeClr>
+                </a:solidFill>
+              </a:rPr>
+              <a:t> </a:t>
+            </a:r>
+            <a:r>
+              <a:rPr lang="de-AT" dirty="0" err="1" smtClean="0">
+                <a:solidFill>
+                  <a:schemeClr val="bg2">
+                    <a:lumMod val="90000"/>
+                  </a:schemeClr>
+                </a:solidFill>
+              </a:rPr>
+              <a:t>server</a:t>
+            </a:r>
+            <a:r>
+              <a:rPr lang="de-AT" dirty="0">
+                <a:solidFill>
+                  <a:schemeClr val="bg2">
+                    <a:lumMod val="90000"/>
+                  </a:schemeClr>
+                </a:solidFill>
+              </a:rPr>
+              <a:t> </a:t>
+            </a:r>
+            <a:r>
+              <a:rPr lang="de-AT" dirty="0" smtClean="0">
+                <a:solidFill>
+                  <a:schemeClr val="bg2">
+                    <a:lumMod val="90000"/>
+                  </a:schemeClr>
+                </a:solidFill>
+              </a:rPr>
+              <a:t>(base64 </a:t>
+            </a:r>
+            <a:r>
+              <a:rPr lang="de-AT" dirty="0" err="1" smtClean="0">
+                <a:solidFill>
+                  <a:schemeClr val="bg2">
+                    <a:lumMod val="90000"/>
+                  </a:schemeClr>
+                </a:solidFill>
+              </a:rPr>
+              <a:t>to</a:t>
+            </a:r>
+            <a:r>
+              <a:rPr lang="de-AT" dirty="0" smtClean="0">
+                <a:solidFill>
+                  <a:schemeClr val="bg2">
+                    <a:lumMod val="90000"/>
+                  </a:schemeClr>
+                </a:solidFill>
+              </a:rPr>
+              <a:t> </a:t>
+            </a:r>
+            <a:r>
+              <a:rPr lang="de-AT" dirty="0" err="1" smtClean="0">
+                <a:solidFill>
+                  <a:schemeClr val="bg2">
+                    <a:lumMod val="90000"/>
+                  </a:schemeClr>
+                </a:solidFill>
+              </a:rPr>
+              <a:t>blob</a:t>
+            </a:r>
+            <a:r>
+              <a:rPr lang="de-AT" dirty="0" smtClean="0">
+                <a:solidFill>
+                  <a:schemeClr val="bg2">
+                    <a:lumMod val="90000"/>
+                  </a:schemeClr>
+                </a:solidFill>
+              </a:rPr>
+              <a:t>)</a:t>
+            </a:r>
+          </a:p>
+          <a:p>
+            <a:pPr marL="457200" lvl="1" indent="0">
+              <a:buNone/>
+            </a:pPr>
+            <a:endParaRPr lang="de-AT" dirty="0" smtClean="0"/>
+          </a:p>
+          <a:p>
+            <a:pPr lvl="1"/>
+            <a:endParaRPr lang="de-AT" dirty="0" smtClean="0"/>
+          </a:p>
+          <a:p>
+            <a:pPr marL="457200" lvl="1" indent="0">
+              <a:buNone/>
+            </a:pPr>
+            <a:r>
               <a:rPr lang="de-AT" dirty="0"/>
-              <a:t>Google </a:t>
-            </a:r>
-            <a:r>
-              <a:rPr lang="de-AT" dirty="0" err="1"/>
-              <a:t>Firebase</a:t>
-            </a:r>
+              <a:t>	</a:t>
+            </a:r>
+            <a:endParaRPr lang="de-AT" dirty="0" smtClean="0"/>
+          </a:p>
+          <a:p>
             <a:endParaRPr lang="de-AT" dirty="0"/>
-          </a:p>
-          <a:p>
-            <a:r>
-              <a:rPr lang="de-AT" dirty="0"/>
-              <a:t>Realtime Database</a:t>
-            </a:r>
-          </a:p>
-          <a:p>
-            <a:r>
-              <a:rPr lang="de-AT" dirty="0" err="1">
-                <a:solidFill>
-                  <a:srgbClr val="FF0000"/>
-                </a:solidFill>
-              </a:rPr>
-              <a:t>No</a:t>
-            </a:r>
-            <a:r>
-              <a:rPr lang="de-AT" dirty="0">
-                <a:solidFill>
-                  <a:srgbClr val="FF0000"/>
-                </a:solidFill>
-              </a:rPr>
-              <a:t> </a:t>
-            </a:r>
-            <a:r>
-              <a:rPr lang="de-AT" dirty="0" err="1">
-                <a:solidFill>
-                  <a:srgbClr val="FF0000"/>
-                </a:solidFill>
-              </a:rPr>
-              <a:t>authentication</a:t>
-            </a:r>
-            <a:r>
-              <a:rPr lang="de-AT" dirty="0">
-                <a:solidFill>
-                  <a:srgbClr val="FF0000"/>
-                </a:solidFill>
-              </a:rPr>
-              <a:t> </a:t>
-            </a:r>
-            <a:r>
-              <a:rPr lang="de-AT" dirty="0" err="1">
-                <a:solidFill>
-                  <a:srgbClr val="FF0000"/>
-                </a:solidFill>
-              </a:rPr>
-              <a:t>for</a:t>
-            </a:r>
-            <a:r>
-              <a:rPr lang="de-AT" dirty="0">
-                <a:solidFill>
-                  <a:srgbClr val="FF0000"/>
-                </a:solidFill>
-              </a:rPr>
-              <a:t> </a:t>
-            </a:r>
-            <a:r>
-              <a:rPr lang="de-AT" dirty="0" err="1">
-                <a:solidFill>
-                  <a:srgbClr val="FF0000"/>
-                </a:solidFill>
-              </a:rPr>
-              <a:t>this</a:t>
-            </a:r>
-            <a:r>
-              <a:rPr lang="de-AT" dirty="0">
-                <a:solidFill>
-                  <a:srgbClr val="FF0000"/>
-                </a:solidFill>
-              </a:rPr>
-              <a:t> </a:t>
-            </a:r>
-            <a:r>
-              <a:rPr lang="de-AT" dirty="0" err="1">
-                <a:solidFill>
-                  <a:srgbClr val="FF0000"/>
-                </a:solidFill>
-              </a:rPr>
-              <a:t>purpose</a:t>
-            </a:r>
-            <a:endParaRPr lang="de-AT" dirty="0">
-              <a:solidFill>
-                <a:srgbClr val="FF0000"/>
-              </a:solidFill>
-            </a:endParaRPr>
           </a:p>
         </p:txBody>
       </p:sp>
     </p:spTree>
     <p:extLst>
       <p:ext uri="{BB962C8B-B14F-4D97-AF65-F5344CB8AC3E}">
-        <p14:creationId xmlns:p14="http://schemas.microsoft.com/office/powerpoint/2010/main" val="753469658"/>
+        <p14:creationId xmlns:p14="http://schemas.microsoft.com/office/powerpoint/2010/main" val="2454698890"/>
+      </p:ext>
+    </p:extLst>
+  </p:cSld>
+  <p:clrMapOvr>
+    <a:masterClrMapping/>
+  </p:clrMapOvr>
+</p:sld>
+</file>
+
+<file path=ppt/slides/slide78.xml><?xml version="1.0" encoding="utf-8"?>
+<p:sld xmlns:a="http://schemas.openxmlformats.org/drawingml/2006/main" xmlns:r="http://schemas.openxmlformats.org/officeDocument/2006/relationships" xmlns:p="http://schemas.openxmlformats.org/presentationml/2006/main">
+  <p:cSld>
+    <p:spTree>
+      <p:nvGrpSpPr>
+        <p:cNvPr id="1" name=""/>
+        <p:cNvGrpSpPr/>
+        <p:nvPr/>
+      </p:nvGrpSpPr>
+      <p:grpSpPr>
+        <a:xfrm>
+          <a:off x="0" y="0"/>
+          <a:ext cx="0" cy="0"/>
+          <a:chOff x="0" y="0"/>
+          <a:chExt cx="0" cy="0"/>
+        </a:xfrm>
+      </p:grpSpPr>
+      <p:sp>
+        <p:nvSpPr>
+          <p:cNvPr id="2" name="Titel 1"/>
+          <p:cNvSpPr>
+            <a:spLocks noGrp="1"/>
+          </p:cNvSpPr>
+          <p:nvPr>
+            <p:ph type="title"/>
+          </p:nvPr>
+        </p:nvSpPr>
+        <p:spPr/>
+        <p:txBody>
+          <a:bodyPr/>
+          <a:lstStyle/>
+          <a:p>
+            <a:r>
+              <a:rPr lang="de-AT" dirty="0" smtClean="0"/>
+              <a:t>Native </a:t>
+            </a:r>
+            <a:r>
+              <a:rPr lang="de-AT" dirty="0" err="1" smtClean="0"/>
+              <a:t>Recipe</a:t>
+            </a:r>
+            <a:r>
+              <a:rPr lang="de-AT" dirty="0" smtClean="0"/>
+              <a:t> </a:t>
+            </a:r>
+            <a:r>
+              <a:rPr lang="de-AT" dirty="0" err="1" smtClean="0"/>
+              <a:t>For</a:t>
+            </a:r>
+            <a:r>
+              <a:rPr lang="de-AT" dirty="0" smtClean="0"/>
+              <a:t> Position</a:t>
+            </a:r>
+            <a:endParaRPr lang="de-AT" dirty="0"/>
+          </a:p>
+        </p:txBody>
+      </p:sp>
+      <p:sp>
+        <p:nvSpPr>
+          <p:cNvPr id="3" name="Inhaltsplatzhalter 2"/>
+          <p:cNvSpPr>
+            <a:spLocks noGrp="1"/>
+          </p:cNvSpPr>
+          <p:nvPr>
+            <p:ph idx="1"/>
+          </p:nvPr>
+        </p:nvSpPr>
+        <p:spPr/>
+        <p:txBody>
+          <a:bodyPr/>
+          <a:lstStyle/>
+          <a:p>
+            <a:r>
+              <a:rPr lang="de-AT" dirty="0" smtClean="0"/>
+              <a:t>Add HTML</a:t>
+            </a:r>
+          </a:p>
+          <a:p>
+            <a:pPr lvl="1"/>
+            <a:r>
+              <a:rPr lang="de-AT" dirty="0" smtClean="0"/>
+              <a:t>Button</a:t>
+            </a:r>
+            <a:endParaRPr lang="de-AT" dirty="0"/>
+          </a:p>
+          <a:p>
+            <a:r>
+              <a:rPr lang="de-AT" dirty="0" smtClean="0"/>
+              <a:t>Add </a:t>
+            </a:r>
+            <a:r>
+              <a:rPr lang="de-AT" dirty="0" err="1" smtClean="0"/>
+              <a:t>code</a:t>
+            </a:r>
+            <a:endParaRPr lang="de-AT" dirty="0" smtClean="0"/>
+          </a:p>
+          <a:p>
+            <a:pPr lvl="1"/>
+            <a:r>
+              <a:rPr lang="de-AT" dirty="0" err="1" smtClean="0"/>
+              <a:t>Navigator.geolocation</a:t>
+            </a:r>
+            <a:endParaRPr lang="de-AT" dirty="0" smtClean="0"/>
+          </a:p>
+        </p:txBody>
+      </p:sp>
+    </p:spTree>
+    <p:extLst>
+      <p:ext uri="{BB962C8B-B14F-4D97-AF65-F5344CB8AC3E}">
+        <p14:creationId xmlns:p14="http://schemas.microsoft.com/office/powerpoint/2010/main" val="1313899771"/>
+      </p:ext>
+    </p:extLst>
+  </p:cSld>
+  <p:clrMapOvr>
+    <a:masterClrMapping/>
+  </p:clrMapOvr>
+</p:sld>
+</file>
+
+<file path=ppt/slides/slide79.xml><?xml version="1.0" encoding="utf-8"?>
+<p:sld xmlns:a="http://schemas.openxmlformats.org/drawingml/2006/main" xmlns:r="http://schemas.openxmlformats.org/officeDocument/2006/relationships" xmlns:p="http://schemas.openxmlformats.org/presentationml/2006/main">
+  <p:cSld>
+    <p:spTree>
+      <p:nvGrpSpPr>
+        <p:cNvPr id="1" name=""/>
+        <p:cNvGrpSpPr/>
+        <p:nvPr/>
+      </p:nvGrpSpPr>
+      <p:grpSpPr>
+        <a:xfrm>
+          <a:off x="0" y="0"/>
+          <a:ext cx="0" cy="0"/>
+          <a:chOff x="0" y="0"/>
+          <a:chExt cx="0" cy="0"/>
+        </a:xfrm>
+      </p:grpSpPr>
+      <p:sp>
+        <p:nvSpPr>
+          <p:cNvPr id="2" name="Titel 1"/>
+          <p:cNvSpPr>
+            <a:spLocks noGrp="1"/>
+          </p:cNvSpPr>
+          <p:nvPr>
+            <p:ph type="title"/>
+          </p:nvPr>
+        </p:nvSpPr>
+        <p:spPr/>
+        <p:txBody>
+          <a:bodyPr/>
+          <a:lstStyle/>
+          <a:p>
+            <a:r>
+              <a:rPr lang="de-AT" dirty="0" smtClean="0"/>
+              <a:t>Links</a:t>
+            </a:r>
+            <a:endParaRPr lang="de-AT" dirty="0"/>
+          </a:p>
+        </p:txBody>
+      </p:sp>
+      <p:sp>
+        <p:nvSpPr>
+          <p:cNvPr id="3" name="Inhaltsplatzhalter 2"/>
+          <p:cNvSpPr>
+            <a:spLocks noGrp="1"/>
+          </p:cNvSpPr>
+          <p:nvPr>
+            <p:ph idx="1"/>
+          </p:nvPr>
+        </p:nvSpPr>
+        <p:spPr/>
+        <p:txBody>
+          <a:bodyPr/>
+          <a:lstStyle/>
+          <a:p>
+            <a:r>
+              <a:rPr lang="en-US" dirty="0"/>
+              <a:t>More about the Media Stream API on MDN: </a:t>
+            </a:r>
+            <a:r>
+              <a:rPr lang="en-US" dirty="0">
+                <a:hlinkClick r:id="rId2"/>
+              </a:rPr>
+              <a:t>https://developer.mozilla.org/en-US/docs/Web/API/Media_Streams_API/Constraints</a:t>
+            </a:r>
+            <a:endParaRPr lang="en-US" dirty="0"/>
+          </a:p>
+          <a:p>
+            <a:r>
+              <a:rPr lang="en-US" dirty="0"/>
+              <a:t>More about </a:t>
+            </a:r>
+            <a:r>
+              <a:rPr lang="en-US" dirty="0" err="1"/>
+              <a:t>getUserMedia</a:t>
+            </a:r>
+            <a:r>
+              <a:rPr lang="en-US" dirty="0"/>
+              <a:t>: </a:t>
+            </a:r>
+            <a:r>
+              <a:rPr lang="en-US" dirty="0">
+                <a:hlinkClick r:id="rId3"/>
+              </a:rPr>
+              <a:t>https://developer.mozilla.org/en-US/docs/Web/API/MediaDevices/getUserMedia</a:t>
+            </a:r>
+            <a:endParaRPr lang="en-US" dirty="0"/>
+          </a:p>
+          <a:p>
+            <a:r>
+              <a:rPr lang="en-US" dirty="0"/>
+              <a:t>How to use geolocation: </a:t>
+            </a:r>
+            <a:r>
+              <a:rPr lang="en-US" dirty="0">
+                <a:hlinkClick r:id="rId4"/>
+              </a:rPr>
+              <a:t>https://developer.mozilla.org/en-US/docs/Web/API/Geolocation/Using_geolocation</a:t>
+            </a:r>
+            <a:endParaRPr lang="en-US" dirty="0"/>
+          </a:p>
+          <a:p>
+            <a:endParaRPr lang="de-AT" dirty="0"/>
+          </a:p>
+        </p:txBody>
+      </p:sp>
+    </p:spTree>
+    <p:extLst>
+      <p:ext uri="{BB962C8B-B14F-4D97-AF65-F5344CB8AC3E}">
+        <p14:creationId xmlns:p14="http://schemas.microsoft.com/office/powerpoint/2010/main" val="202925844"/>
       </p:ext>
     </p:extLst>
   </p:cSld>
@@ -31203,6 +31416,598 @@
     <p:extLst>
       <p:ext uri="{BB962C8B-B14F-4D97-AF65-F5344CB8AC3E}">
         <p14:creationId xmlns:p14="http://schemas.microsoft.com/office/powerpoint/2010/main" val="775921924"/>
+      </p:ext>
+    </p:extLst>
+  </p:cSld>
+  <p:clrMapOvr>
+    <a:masterClrMapping/>
+  </p:clrMapOvr>
+</p:sld>
+</file>
+
+<file path=ppt/slides/slide80.xml><?xml version="1.0" encoding="utf-8"?>
+<p:sld xmlns:a="http://schemas.openxmlformats.org/drawingml/2006/main" xmlns:r="http://schemas.openxmlformats.org/officeDocument/2006/relationships" xmlns:p="http://schemas.openxmlformats.org/presentationml/2006/main">
+  <p:cSld>
+    <p:spTree>
+      <p:nvGrpSpPr>
+        <p:cNvPr id="1" name=""/>
+        <p:cNvGrpSpPr/>
+        <p:nvPr/>
+      </p:nvGrpSpPr>
+      <p:grpSpPr>
+        <a:xfrm>
+          <a:off x="0" y="0"/>
+          <a:ext cx="0" cy="0"/>
+          <a:chOff x="0" y="0"/>
+          <a:chExt cx="0" cy="0"/>
+        </a:xfrm>
+      </p:grpSpPr>
+      <p:sp>
+        <p:nvSpPr>
+          <p:cNvPr id="2" name="Titel 1"/>
+          <p:cNvSpPr>
+            <a:spLocks noGrp="1"/>
+          </p:cNvSpPr>
+          <p:nvPr>
+            <p:ph type="title"/>
+          </p:nvPr>
+        </p:nvSpPr>
+        <p:spPr/>
+        <p:txBody>
+          <a:bodyPr/>
+          <a:lstStyle/>
+          <a:p>
+            <a:r>
+              <a:rPr lang="de-AT" dirty="0"/>
+              <a:t>Outline</a:t>
+            </a:r>
+          </a:p>
+        </p:txBody>
+      </p:sp>
+      <p:sp>
+        <p:nvSpPr>
+          <p:cNvPr id="3" name="Inhaltsplatzhalter 2"/>
+          <p:cNvSpPr>
+            <a:spLocks noGrp="1"/>
+          </p:cNvSpPr>
+          <p:nvPr>
+            <p:ph idx="1"/>
+          </p:nvPr>
+        </p:nvSpPr>
+        <p:spPr/>
+        <p:txBody>
+          <a:bodyPr>
+            <a:normAutofit lnSpcReduction="10000"/>
+          </a:bodyPr>
+          <a:lstStyle/>
+          <a:p>
+            <a:pPr marL="514350" indent="-514350">
+              <a:buFont typeface="+mj-lt"/>
+              <a:buAutoNum type="arabicPeriod"/>
+            </a:pPr>
+            <a:r>
+              <a:rPr lang="de-AT" dirty="0">
+                <a:solidFill>
+                  <a:schemeClr val="accent6">
+                    <a:lumMod val="60000"/>
+                    <a:lumOff val="40000"/>
+                  </a:schemeClr>
+                </a:solidFill>
+              </a:rPr>
+              <a:t>Basics</a:t>
+            </a:r>
+          </a:p>
+          <a:p>
+            <a:pPr marL="971550" lvl="1" indent="-514350">
+              <a:buFont typeface="+mj-lt"/>
+              <a:buAutoNum type="arabicPeriod"/>
+            </a:pPr>
+            <a:r>
+              <a:rPr lang="de-AT" dirty="0">
+                <a:solidFill>
+                  <a:schemeClr val="accent6">
+                    <a:lumMod val="60000"/>
+                    <a:lumOff val="40000"/>
+                  </a:schemeClr>
+                </a:solidFill>
+              </a:rPr>
+              <a:t>App Manifest </a:t>
+            </a:r>
+          </a:p>
+          <a:p>
+            <a:pPr marL="971550" lvl="1" indent="-514350">
+              <a:buFont typeface="+mj-lt"/>
+              <a:buAutoNum type="arabicPeriod"/>
+            </a:pPr>
+            <a:r>
+              <a:rPr lang="de-AT" dirty="0">
+                <a:solidFill>
+                  <a:schemeClr val="accent6">
+                    <a:lumMod val="60000"/>
+                    <a:lumOff val="40000"/>
+                  </a:schemeClr>
+                </a:solidFill>
+              </a:rPr>
+              <a:t>Service </a:t>
+            </a:r>
+            <a:r>
+              <a:rPr lang="de-AT" dirty="0" err="1">
+                <a:solidFill>
+                  <a:schemeClr val="accent6">
+                    <a:lumMod val="60000"/>
+                    <a:lumOff val="40000"/>
+                  </a:schemeClr>
+                </a:solidFill>
+              </a:rPr>
+              <a:t>Workers</a:t>
+            </a:r>
+            <a:endParaRPr lang="de-AT" dirty="0">
+              <a:solidFill>
+                <a:schemeClr val="accent6">
+                  <a:lumMod val="60000"/>
+                  <a:lumOff val="40000"/>
+                </a:schemeClr>
+              </a:solidFill>
+            </a:endParaRPr>
+          </a:p>
+          <a:p>
+            <a:pPr marL="971550" lvl="1" indent="-514350">
+              <a:buFont typeface="+mj-lt"/>
+              <a:buAutoNum type="arabicPeriod"/>
+            </a:pPr>
+            <a:r>
+              <a:rPr lang="de-AT" dirty="0">
+                <a:solidFill>
+                  <a:schemeClr val="accent6">
+                    <a:lumMod val="60000"/>
+                    <a:lumOff val="40000"/>
+                  </a:schemeClr>
+                </a:solidFill>
+              </a:rPr>
+              <a:t>Installation</a:t>
+            </a:r>
+          </a:p>
+          <a:p>
+            <a:pPr marL="514350" indent="-514350">
+              <a:buFont typeface="+mj-lt"/>
+              <a:buAutoNum type="arabicPeriod"/>
+            </a:pPr>
+            <a:r>
+              <a:rPr lang="de-AT" dirty="0" err="1">
+                <a:solidFill>
+                  <a:schemeClr val="accent6">
+                    <a:lumMod val="60000"/>
+                    <a:lumOff val="40000"/>
+                  </a:schemeClr>
+                </a:solidFill>
+              </a:rPr>
+              <a:t>Promise</a:t>
+            </a:r>
+            <a:r>
+              <a:rPr lang="de-AT" dirty="0">
+                <a:solidFill>
+                  <a:schemeClr val="accent6">
+                    <a:lumMod val="60000"/>
+                    <a:lumOff val="40000"/>
+                  </a:schemeClr>
+                </a:solidFill>
+              </a:rPr>
+              <a:t> </a:t>
+            </a:r>
+            <a:r>
+              <a:rPr lang="de-AT" dirty="0" err="1">
+                <a:solidFill>
+                  <a:schemeClr val="accent6">
+                    <a:lumMod val="60000"/>
+                    <a:lumOff val="40000"/>
+                  </a:schemeClr>
+                </a:solidFill>
+              </a:rPr>
+              <a:t>and</a:t>
+            </a:r>
+            <a:r>
+              <a:rPr lang="de-AT" dirty="0">
+                <a:solidFill>
+                  <a:schemeClr val="accent6">
+                    <a:lumMod val="60000"/>
+                    <a:lumOff val="40000"/>
+                  </a:schemeClr>
+                </a:solidFill>
+              </a:rPr>
+              <a:t> </a:t>
+            </a:r>
+            <a:r>
+              <a:rPr lang="de-AT" dirty="0" err="1">
+                <a:solidFill>
+                  <a:schemeClr val="accent6">
+                    <a:lumMod val="60000"/>
+                    <a:lumOff val="40000"/>
+                  </a:schemeClr>
+                </a:solidFill>
+              </a:rPr>
+              <a:t>Fetch</a:t>
+            </a:r>
+            <a:r>
+              <a:rPr lang="de-AT" dirty="0">
+                <a:solidFill>
+                  <a:schemeClr val="accent6">
+                    <a:lumMod val="60000"/>
+                    <a:lumOff val="40000"/>
+                  </a:schemeClr>
+                </a:solidFill>
+              </a:rPr>
+              <a:t>, Service Worker Caching</a:t>
+            </a:r>
+          </a:p>
+          <a:p>
+            <a:pPr marL="514350" indent="-514350">
+              <a:buFont typeface="+mj-lt"/>
+              <a:buAutoNum type="arabicPeriod"/>
+            </a:pPr>
+            <a:r>
+              <a:rPr lang="de-AT" dirty="0" err="1">
+                <a:solidFill>
+                  <a:schemeClr val="accent6">
+                    <a:lumMod val="60000"/>
+                    <a:lumOff val="40000"/>
+                  </a:schemeClr>
+                </a:solidFill>
+              </a:rPr>
+              <a:t>Advanced</a:t>
+            </a:r>
+            <a:r>
+              <a:rPr lang="de-AT" dirty="0">
+                <a:solidFill>
+                  <a:schemeClr val="accent6">
+                    <a:lumMod val="60000"/>
+                    <a:lumOff val="40000"/>
+                  </a:schemeClr>
+                </a:solidFill>
+              </a:rPr>
+              <a:t> Caching, </a:t>
+            </a:r>
+            <a:r>
+              <a:rPr lang="de-AT" dirty="0" err="1">
+                <a:solidFill>
+                  <a:schemeClr val="accent6">
+                    <a:lumMod val="60000"/>
+                    <a:lumOff val="40000"/>
+                  </a:schemeClr>
+                </a:solidFill>
+              </a:rPr>
+              <a:t>Indexed</a:t>
+            </a:r>
+            <a:r>
+              <a:rPr lang="de-AT" dirty="0">
+                <a:solidFill>
+                  <a:schemeClr val="accent6">
+                    <a:lumMod val="60000"/>
+                    <a:lumOff val="40000"/>
+                  </a:schemeClr>
+                </a:solidFill>
+              </a:rPr>
+              <a:t> DB </a:t>
+            </a:r>
+            <a:r>
+              <a:rPr lang="de-AT" dirty="0" err="1">
+                <a:solidFill>
+                  <a:schemeClr val="accent6">
+                    <a:lumMod val="60000"/>
+                    <a:lumOff val="40000"/>
+                  </a:schemeClr>
+                </a:solidFill>
+              </a:rPr>
+              <a:t>and</a:t>
+            </a:r>
+            <a:r>
+              <a:rPr lang="de-AT" dirty="0">
+                <a:solidFill>
+                  <a:schemeClr val="accent6">
+                    <a:lumMod val="60000"/>
+                    <a:lumOff val="40000"/>
+                  </a:schemeClr>
+                </a:solidFill>
+              </a:rPr>
+              <a:t> Dynamic Data</a:t>
+            </a:r>
+          </a:p>
+          <a:p>
+            <a:pPr marL="514350" indent="-514350">
+              <a:buFont typeface="+mj-lt"/>
+              <a:buAutoNum type="arabicPeriod"/>
+            </a:pPr>
+            <a:r>
+              <a:rPr lang="de-AT" dirty="0" err="1">
+                <a:solidFill>
+                  <a:schemeClr val="accent6">
+                    <a:lumMod val="60000"/>
+                    <a:lumOff val="40000"/>
+                  </a:schemeClr>
+                </a:solidFill>
+              </a:rPr>
+              <a:t>Responsive</a:t>
+            </a:r>
+            <a:r>
+              <a:rPr lang="de-AT" dirty="0">
+                <a:solidFill>
+                  <a:schemeClr val="accent6">
+                    <a:lumMod val="60000"/>
+                    <a:lumOff val="40000"/>
+                  </a:schemeClr>
+                </a:solidFill>
+              </a:rPr>
+              <a:t> UI, Background </a:t>
+            </a:r>
+            <a:r>
+              <a:rPr lang="de-AT" dirty="0" err="1">
+                <a:solidFill>
+                  <a:schemeClr val="accent6">
+                    <a:lumMod val="60000"/>
+                    <a:lumOff val="40000"/>
+                  </a:schemeClr>
+                </a:solidFill>
+              </a:rPr>
+              <a:t>Sync</a:t>
+            </a:r>
+            <a:r>
+              <a:rPr lang="de-AT" dirty="0">
+                <a:solidFill>
+                  <a:schemeClr val="accent6">
+                    <a:lumMod val="60000"/>
+                    <a:lumOff val="40000"/>
+                  </a:schemeClr>
+                </a:solidFill>
+              </a:rPr>
+              <a:t> </a:t>
+            </a:r>
+          </a:p>
+          <a:p>
+            <a:pPr marL="514350" indent="-514350">
+              <a:buFont typeface="+mj-lt"/>
+              <a:buAutoNum type="arabicPeriod"/>
+            </a:pPr>
+            <a:r>
+              <a:rPr lang="de-AT" dirty="0">
+                <a:solidFill>
+                  <a:schemeClr val="accent6">
+                    <a:lumMod val="60000"/>
+                    <a:lumOff val="40000"/>
+                  </a:schemeClr>
+                </a:solidFill>
+              </a:rPr>
+              <a:t>Web Push </a:t>
+            </a:r>
+            <a:r>
+              <a:rPr lang="de-AT" dirty="0" err="1">
+                <a:solidFill>
+                  <a:schemeClr val="accent6">
+                    <a:lumMod val="60000"/>
+                    <a:lumOff val="40000"/>
+                  </a:schemeClr>
+                </a:solidFill>
+              </a:rPr>
+              <a:t>Notifications</a:t>
+            </a:r>
+            <a:r>
+              <a:rPr lang="de-AT" dirty="0">
+                <a:solidFill>
+                  <a:schemeClr val="accent6">
+                    <a:lumMod val="60000"/>
+                    <a:lumOff val="40000"/>
+                  </a:schemeClr>
+                </a:solidFill>
+              </a:rPr>
+              <a:t> </a:t>
+            </a:r>
+          </a:p>
+          <a:p>
+            <a:pPr marL="514350" indent="-514350">
+              <a:buFont typeface="+mj-lt"/>
+              <a:buAutoNum type="arabicPeriod"/>
+            </a:pPr>
+            <a:r>
+              <a:rPr lang="de-AT" dirty="0">
+                <a:solidFill>
+                  <a:schemeClr val="accent6">
+                    <a:lumMod val="60000"/>
+                    <a:lumOff val="40000"/>
+                  </a:schemeClr>
+                </a:solidFill>
+              </a:rPr>
+              <a:t>Native Device Features</a:t>
+            </a:r>
+          </a:p>
+          <a:p>
+            <a:pPr marL="514350" indent="-514350">
+              <a:buFont typeface="+mj-lt"/>
+              <a:buAutoNum type="arabicPeriod"/>
+            </a:pPr>
+            <a:r>
+              <a:rPr lang="de-AT" dirty="0"/>
+              <a:t>Round </a:t>
+            </a:r>
+            <a:r>
+              <a:rPr lang="de-AT" dirty="0" err="1"/>
+              <a:t>Up</a:t>
+            </a:r>
+            <a:r>
+              <a:rPr lang="de-AT" dirty="0"/>
+              <a:t> &amp; Quiz</a:t>
+            </a:r>
+          </a:p>
+          <a:p>
+            <a:endParaRPr lang="de-AT" dirty="0"/>
+          </a:p>
+        </p:txBody>
+      </p:sp>
+    </p:spTree>
+    <p:extLst>
+      <p:ext uri="{BB962C8B-B14F-4D97-AF65-F5344CB8AC3E}">
+        <p14:creationId xmlns:p14="http://schemas.microsoft.com/office/powerpoint/2010/main" val="2022339406"/>
+      </p:ext>
+    </p:extLst>
+  </p:cSld>
+  <p:clrMapOvr>
+    <a:masterClrMapping/>
+  </p:clrMapOvr>
+</p:sld>
+</file>
+
+<file path=ppt/slides/slide81.xml><?xml version="1.0" encoding="utf-8"?>
+<p:sld xmlns:a="http://schemas.openxmlformats.org/drawingml/2006/main" xmlns:r="http://schemas.openxmlformats.org/officeDocument/2006/relationships" xmlns:p="http://schemas.openxmlformats.org/presentationml/2006/main">
+  <p:cSld>
+    <p:spTree>
+      <p:nvGrpSpPr>
+        <p:cNvPr id="1" name=""/>
+        <p:cNvGrpSpPr/>
+        <p:nvPr/>
+      </p:nvGrpSpPr>
+      <p:grpSpPr>
+        <a:xfrm>
+          <a:off x="0" y="0"/>
+          <a:ext cx="0" cy="0"/>
+          <a:chOff x="0" y="0"/>
+          <a:chExt cx="0" cy="0"/>
+        </a:xfrm>
+      </p:grpSpPr>
+      <p:sp>
+        <p:nvSpPr>
+          <p:cNvPr id="2" name="Titel 1"/>
+          <p:cNvSpPr>
+            <a:spLocks noGrp="1"/>
+          </p:cNvSpPr>
+          <p:nvPr>
+            <p:ph type="title"/>
+          </p:nvPr>
+        </p:nvSpPr>
+        <p:spPr/>
+        <p:txBody>
+          <a:bodyPr/>
+          <a:lstStyle/>
+          <a:p>
+            <a:r>
+              <a:rPr lang="de-AT" dirty="0"/>
+              <a:t>Backend</a:t>
+            </a:r>
+          </a:p>
+        </p:txBody>
+      </p:sp>
+      <p:sp>
+        <p:nvSpPr>
+          <p:cNvPr id="3" name="Inhaltsplatzhalter 2"/>
+          <p:cNvSpPr>
+            <a:spLocks noGrp="1"/>
+          </p:cNvSpPr>
+          <p:nvPr>
+            <p:ph idx="1"/>
+          </p:nvPr>
+        </p:nvSpPr>
+        <p:spPr/>
+        <p:txBody>
+          <a:bodyPr/>
+          <a:lstStyle/>
+          <a:p>
+            <a:r>
+              <a:rPr lang="de-AT" dirty="0"/>
+              <a:t>Google </a:t>
+            </a:r>
+            <a:r>
+              <a:rPr lang="de-AT" dirty="0" err="1"/>
+              <a:t>Firebase</a:t>
+            </a:r>
+            <a:endParaRPr lang="de-AT" dirty="0"/>
+          </a:p>
+          <a:p>
+            <a:r>
+              <a:rPr lang="de-AT" dirty="0"/>
+              <a:t>Realtime Database</a:t>
+            </a:r>
+          </a:p>
+          <a:p>
+            <a:r>
+              <a:rPr lang="de-AT" dirty="0" err="1">
+                <a:solidFill>
+                  <a:srgbClr val="FF0000"/>
+                </a:solidFill>
+              </a:rPr>
+              <a:t>No</a:t>
+            </a:r>
+            <a:r>
+              <a:rPr lang="de-AT" dirty="0">
+                <a:solidFill>
+                  <a:srgbClr val="FF0000"/>
+                </a:solidFill>
+              </a:rPr>
+              <a:t> </a:t>
+            </a:r>
+            <a:r>
+              <a:rPr lang="de-AT" dirty="0" err="1">
+                <a:solidFill>
+                  <a:srgbClr val="FF0000"/>
+                </a:solidFill>
+              </a:rPr>
+              <a:t>authentication</a:t>
+            </a:r>
+            <a:r>
+              <a:rPr lang="de-AT" dirty="0">
+                <a:solidFill>
+                  <a:srgbClr val="FF0000"/>
+                </a:solidFill>
+              </a:rPr>
+              <a:t> </a:t>
+            </a:r>
+            <a:r>
+              <a:rPr lang="de-AT" dirty="0" err="1">
+                <a:solidFill>
+                  <a:srgbClr val="FF0000"/>
+                </a:solidFill>
+              </a:rPr>
+              <a:t>for</a:t>
+            </a:r>
+            <a:r>
+              <a:rPr lang="de-AT" dirty="0">
+                <a:solidFill>
+                  <a:srgbClr val="FF0000"/>
+                </a:solidFill>
+              </a:rPr>
+              <a:t> </a:t>
+            </a:r>
+            <a:r>
+              <a:rPr lang="de-AT" dirty="0" err="1">
+                <a:solidFill>
+                  <a:srgbClr val="FF0000"/>
+                </a:solidFill>
+              </a:rPr>
+              <a:t>this</a:t>
+            </a:r>
+            <a:r>
+              <a:rPr lang="de-AT" dirty="0">
+                <a:solidFill>
+                  <a:srgbClr val="FF0000"/>
+                </a:solidFill>
+              </a:rPr>
+              <a:t> </a:t>
+            </a:r>
+            <a:r>
+              <a:rPr lang="de-AT" dirty="0" err="1">
+                <a:solidFill>
+                  <a:srgbClr val="FF0000"/>
+                </a:solidFill>
+              </a:rPr>
+              <a:t>purpose</a:t>
+            </a:r>
+            <a:endParaRPr lang="de-AT" dirty="0">
+              <a:solidFill>
+                <a:srgbClr val="FF0000"/>
+              </a:solidFill>
+            </a:endParaRPr>
+          </a:p>
+        </p:txBody>
+      </p:sp>
+    </p:spTree>
+    <p:extLst>
+      <p:ext uri="{BB962C8B-B14F-4D97-AF65-F5344CB8AC3E}">
+        <p14:creationId xmlns:p14="http://schemas.microsoft.com/office/powerpoint/2010/main" val="753469658"/>
       </p:ext>
     </p:extLst>
   </p:cSld>

</xml_diff>